<commit_message>
Committing changes to add new topics.
</commit_message>
<xml_diff>
--- a/courseMaterial/Apply Encapsulation/Encapsulation.pptx
+++ b/courseMaterial/Apply Encapsulation/Encapsulation.pptx
@@ -5,20 +5,21 @@
     <p:sldMasterId id="2147483648" r:id="rId4"/>
   </p:sldMasterIdLst>
   <p:notesMasterIdLst>
-    <p:notesMasterId r:id="rId13"/>
+    <p:notesMasterId r:id="rId14"/>
   </p:notesMasterIdLst>
   <p:handoutMasterIdLst>
-    <p:handoutMasterId r:id="rId14"/>
+    <p:handoutMasterId r:id="rId15"/>
   </p:handoutMasterIdLst>
   <p:sldIdLst>
     <p:sldId id="256" r:id="rId5"/>
     <p:sldId id="261" r:id="rId6"/>
     <p:sldId id="282" r:id="rId7"/>
     <p:sldId id="283" r:id="rId8"/>
-    <p:sldId id="284" r:id="rId9"/>
-    <p:sldId id="257" r:id="rId10"/>
-    <p:sldId id="285" r:id="rId11"/>
-    <p:sldId id="268" r:id="rId12"/>
+    <p:sldId id="286" r:id="rId9"/>
+    <p:sldId id="284" r:id="rId10"/>
+    <p:sldId id="257" r:id="rId11"/>
+    <p:sldId id="285" r:id="rId12"/>
+    <p:sldId id="268" r:id="rId13"/>
   </p:sldIdLst>
   <p:sldSz cx="12192000" cy="6858000"/>
   <p:notesSz cx="6858000" cy="9144000"/>
@@ -4582,11 +4583,7 @@
           <a:p>
             <a:r>
               <a:rPr lang="en-US" sz="5400" dirty="0" smtClean="0"/>
-              <a:t>            </a:t>
-            </a:r>
-            <a:r>
-              <a:rPr lang="en-US" sz="5400" dirty="0" smtClean="0"/>
-              <a:t>       Encapsulation</a:t>
+              <a:t>                   Encapsulation</a:t>
             </a:r>
             <a:endParaRPr lang="en-US" sz="5400" dirty="0"/>
           </a:p>
@@ -4987,9 +4984,10 @@
           <a:p>
             <a:pPr algn="ctr"/>
             <a:r>
-              <a:rPr lang="en-US" dirty="0"/>
-              <a:t>Arrays: An Introduction</a:t>
-            </a:r>
+              <a:rPr lang="en-US" dirty="0" smtClean="0"/>
+              <a:t>Access Modifiers</a:t>
+            </a:r>
+            <a:endParaRPr lang="en-US" dirty="0"/>
           </a:p>
         </p:txBody>
       </p:sp>
@@ -5012,50 +5010,49 @@
         <p:spPr/>
         <p:txBody>
           <a:bodyPr>
-            <a:normAutofit fontScale="92500" lnSpcReduction="20000"/>
+            <a:normAutofit/>
           </a:bodyPr>
           <a:lstStyle/>
           <a:p>
             <a:endParaRPr lang="en-US" sz="2800" dirty="0" smtClean="0"/>
           </a:p>
           <a:p>
+            <a:endParaRPr lang="en-US" sz="2800" dirty="0" smtClean="0"/>
+          </a:p>
+          <a:p>
             <a:r>
               <a:rPr lang="en-US" sz="2800" dirty="0" smtClean="0"/>
-              <a:t>An </a:t>
-            </a:r>
-            <a:r>
-              <a:rPr lang="en-US" sz="2800" dirty="0"/>
-              <a:t>array is a container of values.</a:t>
-            </a:r>
-          </a:p>
-          <a:p>
-            <a:r>
-              <a:rPr lang="en-US" sz="2800" dirty="0"/>
-              <a:t>In general we operate on a single </a:t>
-            </a:r>
-            <a:r>
-              <a:rPr lang="en-US" sz="2800" dirty="0" smtClean="0"/>
-              <a:t>variable/value/object.</a:t>
-            </a:r>
-          </a:p>
-          <a:p>
-            <a:r>
-              <a:rPr lang="en-US" sz="2800" dirty="0" smtClean="0"/>
-              <a:t>When there arises a need for holding multiple values/object ,then we take help of Arrays.</a:t>
-            </a:r>
-          </a:p>
-          <a:p>
-            <a:r>
-              <a:rPr lang="en-US" sz="2800" dirty="0" smtClean="0"/>
-              <a:t>An array of integer type can hold multiple values of integer types.</a:t>
-            </a:r>
-          </a:p>
-          <a:p>
-            <a:r>
-              <a:rPr lang="en-US" sz="2800" dirty="0" smtClean="0"/>
-              <a:t>We have already seen that in the argument to main method an array of String type values are passed.</a:t>
-            </a:r>
-            <a:endParaRPr lang="en-US" sz="2800" dirty="0"/>
+              <a:t>Java has 4 access modifiers </a:t>
+            </a:r>
+          </a:p>
+          <a:p>
+            <a:pPr lvl="1"/>
+            <a:r>
+              <a:rPr lang="en-US" sz="2600" dirty="0" smtClean="0"/>
+              <a:t>Private</a:t>
+            </a:r>
+          </a:p>
+          <a:p>
+            <a:pPr lvl="1"/>
+            <a:r>
+              <a:rPr lang="en-US" sz="2600" dirty="0" smtClean="0"/>
+              <a:t>Default or package-private</a:t>
+            </a:r>
+          </a:p>
+          <a:p>
+            <a:pPr lvl="1"/>
+            <a:r>
+              <a:rPr lang="en-US" sz="2600" dirty="0" smtClean="0"/>
+              <a:t>Protected</a:t>
+            </a:r>
+          </a:p>
+          <a:p>
+            <a:pPr lvl="1"/>
+            <a:r>
+              <a:rPr lang="en-US" sz="2600" dirty="0" smtClean="0"/>
+              <a:t>Public</a:t>
+            </a:r>
+            <a:endParaRPr lang="en-US" sz="2600" dirty="0"/>
           </a:p>
         </p:txBody>
       </p:sp>
@@ -5156,47 +5153,6 @@
           </a:p>
         </p:txBody>
       </p:sp>
-      <p:pic>
-        <p:nvPicPr>
-          <p:cNvPr id="7" name="Picture 2" descr="Illustration of an array as 10 boxes numbered 0 through 9; an index of 0 indicates the first element in the array"/>
-          <p:cNvPicPr>
-            <a:picLocks noChangeAspect="1" noChangeArrowheads="1"/>
-          </p:cNvPicPr>
-          <p:nvPr/>
-        </p:nvPicPr>
-        <p:blipFill>
-          <a:blip r:embed="rId2">
-            <a:extLst>
-              <a:ext uri="{28A0092B-C50C-407E-A947-70E740481C1C}">
-                <a14:useLocalDpi xmlns:a14="http://schemas.microsoft.com/office/drawing/2010/main" val="0"/>
-              </a:ext>
-            </a:extLst>
-          </a:blip>
-          <a:srcRect/>
-          <a:stretch>
-            <a:fillRect/>
-          </a:stretch>
-        </p:blipFill>
-        <p:spPr bwMode="auto">
-          <a:xfrm>
-            <a:off x="8162924" y="2722007"/>
-            <a:ext cx="3190875" cy="1181101"/>
-          </a:xfrm>
-          <a:prstGeom prst="rect">
-            <a:avLst/>
-          </a:prstGeom>
-          <a:noFill/>
-          <a:extLst>
-            <a:ext uri="{909E8E84-426E-40DD-AFC4-6F175D3DCCD1}">
-              <a14:hiddenFill xmlns:a14="http://schemas.microsoft.com/office/drawing/2010/main">
-                <a:solidFill>
-                  <a:srgbClr val="FFFFFF"/>
-                </a:solidFill>
-              </a14:hiddenFill>
-            </a:ext>
-          </a:extLst>
-        </p:spPr>
-      </p:pic>
     </p:spTree>
     <p:extLst>
       <p:ext uri="{BB962C8B-B14F-4D97-AF65-F5344CB8AC3E}">
@@ -5263,7 +5219,7 @@
             <a:pPr algn="ctr"/>
             <a:r>
               <a:rPr lang="en-US" dirty="0" smtClean="0"/>
-              <a:t>Structure of An Array</a:t>
+              <a:t>Restrictions</a:t>
             </a:r>
             <a:endParaRPr lang="en-US" dirty="0"/>
           </a:p>
@@ -5285,78 +5241,45 @@
             <p:ph idx="1"/>
           </p:nvPr>
         </p:nvSpPr>
-        <p:spPr/>
+        <p:spPr>
+          <a:xfrm>
+            <a:off x="838199" y="1825625"/>
+            <a:ext cx="10515599" cy="4351338"/>
+          </a:xfrm>
+        </p:spPr>
         <p:txBody>
           <a:bodyPr>
-            <a:normAutofit fontScale="85000" lnSpcReduction="20000"/>
+            <a:normAutofit/>
           </a:bodyPr>
           <a:lstStyle/>
           <a:p>
             <a:r>
               <a:rPr lang="en-US" sz="2800" dirty="0" smtClean="0"/>
-              <a:t>An array is an </a:t>
-            </a:r>
-            <a:r>
-              <a:rPr lang="en-US" sz="2800" b="1" i="1" u="sng" dirty="0" smtClean="0"/>
-              <a:t>object </a:t>
+              <a:t>A top level class can only have 2 types of modifiers namely, public and default. Whil</a:t>
             </a:r>
             <a:r>
               <a:rPr lang="en-US" sz="2800" dirty="0" smtClean="0"/>
-              <a:t>contains values of the type specified in array declaration statement.</a:t>
-            </a:r>
-            <a:endParaRPr lang="en-US" sz="2800" b="1" i="1" u="sng" dirty="0" smtClean="0"/>
+              <a:t>e an inner class can declare itself with any of the four modifiers.</a:t>
+            </a:r>
           </a:p>
           <a:p>
             <a:r>
               <a:rPr lang="en-US" sz="2800" dirty="0" smtClean="0"/>
-              <a:t>An array is allocated contiguous blocks memory.</a:t>
-            </a:r>
-          </a:p>
-          <a:p>
+              <a:t>A top level interface or </a:t>
+            </a:r>
+            <a:r>
+              <a:rPr lang="en-US" sz="2800" dirty="0" err="1" smtClean="0"/>
+              <a:t>enum</a:t>
+            </a:r>
             <a:r>
               <a:rPr lang="en-US" sz="2800" dirty="0" smtClean="0"/>
-              <a:t>Each block of memory in an array can be accessed by a unique index that is assigned to that block.</a:t>
-            </a:r>
-          </a:p>
-          <a:p>
-            <a:r>
-              <a:rPr lang="en-US" sz="2800" dirty="0" smtClean="0"/>
-              <a:t>Indexing in array starts from 0.</a:t>
-            </a:r>
-          </a:p>
-          <a:p>
-            <a:r>
-              <a:rPr lang="en-US" sz="2800" dirty="0" smtClean="0"/>
-              <a:t>An element in the 3 block of array names ‘</a:t>
-            </a:r>
-            <a:r>
-              <a:rPr lang="en-US" sz="2800" dirty="0" err="1" smtClean="0"/>
-              <a:t>arr</a:t>
-            </a:r>
-            <a:r>
-              <a:rPr lang="en-US" sz="2800" dirty="0" smtClean="0"/>
-              <a:t>’, can be accessed programmatically as </a:t>
-            </a:r>
-            <a:r>
-              <a:rPr lang="en-US" sz="2800" dirty="0" err="1" smtClean="0"/>
-              <a:t>arr</a:t>
-            </a:r>
-            <a:r>
-              <a:rPr lang="en-US" sz="2800" dirty="0" smtClean="0"/>
-              <a:t>[2].</a:t>
-            </a:r>
-          </a:p>
-          <a:p>
-            <a:r>
-              <a:rPr lang="en-US" sz="2800" dirty="0" smtClean="0"/>
-              <a:t>Once created size of the array cannot be changed.</a:t>
-            </a:r>
-          </a:p>
-          <a:p>
-            <a:r>
-              <a:rPr lang="en-US" sz="2800" dirty="0" smtClean="0"/>
-              <a:t>Loops are used to iterate over the entire array.</a:t>
-            </a:r>
+              <a:t> can declare any of the possible four access modifiers.</a:t>
+            </a:r>
+          </a:p>
+          <a:p>
+            <a:endParaRPr lang="en-US" sz="2800" dirty="0" smtClean="0"/>
+          </a:p>
+          <a:p>
             <a:endParaRPr lang="en-US" sz="2800" dirty="0"/>
           </a:p>
         </p:txBody>
@@ -5458,47 +5381,6 @@
           </a:p>
         </p:txBody>
       </p:sp>
-      <p:pic>
-        <p:nvPicPr>
-          <p:cNvPr id="7" name="Picture 2" descr="Illustration of an array as 10 boxes numbered 0 through 9; an index of 0 indicates the first element in the array"/>
-          <p:cNvPicPr>
-            <a:picLocks noChangeAspect="1" noChangeArrowheads="1"/>
-          </p:cNvPicPr>
-          <p:nvPr/>
-        </p:nvPicPr>
-        <p:blipFill>
-          <a:blip r:embed="rId2">
-            <a:extLst>
-              <a:ext uri="{28A0092B-C50C-407E-A947-70E740481C1C}">
-                <a14:useLocalDpi xmlns:a14="http://schemas.microsoft.com/office/drawing/2010/main" val="0"/>
-              </a:ext>
-            </a:extLst>
-          </a:blip>
-          <a:srcRect/>
-          <a:stretch>
-            <a:fillRect/>
-          </a:stretch>
-        </p:blipFill>
-        <p:spPr bwMode="auto">
-          <a:xfrm>
-            <a:off x="8162924" y="2722007"/>
-            <a:ext cx="3190875" cy="1181101"/>
-          </a:xfrm>
-          <a:prstGeom prst="rect">
-            <a:avLst/>
-          </a:prstGeom>
-          <a:noFill/>
-          <a:extLst>
-            <a:ext uri="{909E8E84-426E-40DD-AFC4-6F175D3DCCD1}">
-              <a14:hiddenFill xmlns:a14="http://schemas.microsoft.com/office/drawing/2010/main">
-                <a:solidFill>
-                  <a:srgbClr val="FFFFFF"/>
-                </a:solidFill>
-              </a14:hiddenFill>
-            </a:ext>
-          </a:extLst>
-        </p:spPr>
-      </p:pic>
     </p:spTree>
     <p:extLst>
       <p:ext uri="{BB962C8B-B14F-4D97-AF65-F5344CB8AC3E}">
@@ -5565,7 +5447,11 @@
             <a:pPr algn="ctr"/>
             <a:r>
               <a:rPr lang="en-US" dirty="0" smtClean="0"/>
-              <a:t>Structure of An Array</a:t>
+              <a:t>Interface  &amp; </a:t>
+            </a:r>
+            <a:r>
+              <a:rPr lang="en-US" dirty="0" err="1" smtClean="0"/>
+              <a:t>Enums</a:t>
             </a:r>
             <a:endParaRPr lang="en-US" dirty="0"/>
           </a:p>
@@ -5589,59 +5475,70 @@
         </p:nvSpPr>
         <p:spPr>
           <a:xfrm>
-            <a:off x="838200" y="1825625"/>
-            <a:ext cx="5562600" cy="4351338"/>
+            <a:off x="838199" y="1825625"/>
+            <a:ext cx="10515599" cy="4351338"/>
           </a:xfrm>
         </p:spPr>
         <p:txBody>
           <a:bodyPr>
-            <a:normAutofit fontScale="92500" lnSpcReduction="20000"/>
+            <a:normAutofit/>
           </a:bodyPr>
           <a:lstStyle/>
           <a:p>
             <a:r>
+              <a:rPr lang="en-US" sz="2800" dirty="0"/>
+              <a:t>Java 9 allows an interface to have private methods. However, fields of </a:t>
+            </a:r>
+            <a:r>
               <a:rPr lang="en-US" sz="2800" dirty="0" smtClean="0"/>
-              <a:t>Arrays can be single dimensional or multi-dimensional.</a:t>
-            </a:r>
-          </a:p>
-          <a:p>
+              <a:t>an interface </a:t>
+            </a:r>
+            <a:r>
+              <a:rPr lang="en-US" sz="2800" dirty="0"/>
+              <a:t>are still always public</a:t>
+            </a:r>
             <a:r>
               <a:rPr lang="en-US" sz="2800" dirty="0" smtClean="0"/>
-              <a:t>Figure on the right shows a </a:t>
-            </a:r>
-            <a:br>
-              <a:rPr lang="en-US" sz="2800" dirty="0" smtClean="0"/>
-            </a:br>
-            <a:r>
-              <a:rPr lang="en-US" sz="2800" dirty="0" smtClean="0"/>
-              <a:t>two-dimensional and</a:t>
-            </a:r>
-            <a:br>
-              <a:rPr lang="en-US" sz="2800" dirty="0" smtClean="0"/>
-            </a:br>
-            <a:r>
-              <a:rPr lang="en-US" sz="2800" dirty="0" smtClean="0"/>
-              <a:t>a three-dimensional array.</a:t>
-            </a:r>
-          </a:p>
-          <a:p>
-            <a:r>
-              <a:rPr lang="en-US" sz="2800" dirty="0" smtClean="0"/>
-              <a:t>A multi-dimensional array is just an extension of a 1-D array.</a:t>
-            </a:r>
-          </a:p>
-          <a:p>
-            <a:r>
-              <a:rPr lang="en-US" sz="2800" dirty="0" smtClean="0"/>
-              <a:t>For example ,a 2-D array of dimensions 3*4, can be visualized as a 1-D array of size 3 , with each block pointing to an array of size 4.</a:t>
-            </a:r>
-          </a:p>
-          <a:p>
-            <a:r>
-              <a:rPr lang="en-US" sz="2800" dirty="0" smtClean="0"/>
-              <a:t>Similarly we can extend this analogy to greater dimensions.</a:t>
-            </a:r>
-            <a:endParaRPr lang="en-US" sz="2800" dirty="0"/>
+              <a:t>.</a:t>
+            </a:r>
+          </a:p>
+          <a:p>
+            <a:r>
+              <a:rPr lang="en-US" sz="2800" dirty="0"/>
+              <a:t>The </a:t>
+            </a:r>
+            <a:r>
+              <a:rPr lang="en-US" sz="2800" dirty="0" err="1"/>
+              <a:t>enum</a:t>
+            </a:r>
+            <a:r>
+              <a:rPr lang="en-US" sz="2800" dirty="0"/>
+              <a:t> constants are always public even when no access modifier </a:t>
+            </a:r>
+            <a:r>
+              <a:rPr lang="en-US" sz="2800" dirty="0"/>
+              <a:t>is specified</a:t>
+            </a:r>
+            <a:r>
+              <a:rPr lang="en-US" sz="2800" dirty="0"/>
+              <a:t>. On the other hand, </a:t>
+            </a:r>
+            <a:r>
+              <a:rPr lang="en-US" sz="2800" dirty="0" err="1"/>
+              <a:t>enum</a:t>
+            </a:r>
+            <a:r>
+              <a:rPr lang="en-US" sz="2800" dirty="0"/>
+              <a:t> constructors are always private. </a:t>
+            </a:r>
+            <a:r>
+              <a:rPr lang="en-US" sz="2800" dirty="0"/>
+              <a:t>Compiler will </a:t>
+            </a:r>
+            <a:r>
+              <a:rPr lang="en-US" sz="2800" dirty="0"/>
+              <a:t>generate an error if you try to make them public or protected</a:t>
+            </a:r>
           </a:p>
         </p:txBody>
       </p:sp>
@@ -5742,92 +5639,10 @@
           </a:p>
         </p:txBody>
       </p:sp>
-      <p:pic>
-        <p:nvPicPr>
-          <p:cNvPr id="3074" name="Picture 2" descr="Multidimensional Arrays in C++"/>
-          <p:cNvPicPr>
-            <a:picLocks noChangeAspect="1" noChangeArrowheads="1"/>
-          </p:cNvPicPr>
-          <p:nvPr/>
-        </p:nvPicPr>
-        <p:blipFill>
-          <a:blip r:embed="rId2">
-            <a:extLst>
-              <a:ext uri="{28A0092B-C50C-407E-A947-70E740481C1C}">
-                <a14:useLocalDpi xmlns:a14="http://schemas.microsoft.com/office/drawing/2010/main" val="0"/>
-              </a:ext>
-            </a:extLst>
-          </a:blip>
-          <a:srcRect/>
-          <a:stretch>
-            <a:fillRect/>
-          </a:stretch>
-        </p:blipFill>
-        <p:spPr bwMode="auto">
-          <a:xfrm>
-            <a:off x="7250545" y="1825625"/>
-            <a:ext cx="4103254" cy="1868920"/>
-          </a:xfrm>
-          <a:prstGeom prst="rect">
-            <a:avLst/>
-          </a:prstGeom>
-          <a:noFill/>
-          <a:extLst>
-            <a:ext uri="{909E8E84-426E-40DD-AFC4-6F175D3DCCD1}">
-              <a14:hiddenFill xmlns:a14="http://schemas.microsoft.com/office/drawing/2010/main">
-                <a:solidFill>
-                  <a:srgbClr val="FFFFFF"/>
-                </a:solidFill>
-              </a14:hiddenFill>
-            </a:ext>
-          </a:extLst>
-        </p:spPr>
-      </p:pic>
-      <p:pic>
-        <p:nvPicPr>
-          <p:cNvPr id="3076" name="Picture 4" descr="Multidimensional Arrays - MATLAB &amp; Simulink"/>
-          <p:cNvPicPr>
-            <a:picLocks noChangeAspect="1" noChangeArrowheads="1"/>
-          </p:cNvPicPr>
-          <p:nvPr/>
-        </p:nvPicPr>
-        <p:blipFill>
-          <a:blip r:embed="rId3">
-            <a:extLst>
-              <a:ext uri="{28A0092B-C50C-407E-A947-70E740481C1C}">
-                <a14:useLocalDpi xmlns:a14="http://schemas.microsoft.com/office/drawing/2010/main" val="0"/>
-              </a:ext>
-            </a:extLst>
-          </a:blip>
-          <a:srcRect/>
-          <a:stretch>
-            <a:fillRect/>
-          </a:stretch>
-        </p:blipFill>
-        <p:spPr bwMode="auto">
-          <a:xfrm>
-            <a:off x="7250545" y="4075428"/>
-            <a:ext cx="4103254" cy="1971676"/>
-          </a:xfrm>
-          <a:prstGeom prst="rect">
-            <a:avLst/>
-          </a:prstGeom>
-          <a:noFill/>
-          <a:extLst>
-            <a:ext uri="{909E8E84-426E-40DD-AFC4-6F175D3DCCD1}">
-              <a14:hiddenFill xmlns:a14="http://schemas.microsoft.com/office/drawing/2010/main">
-                <a:solidFill>
-                  <a:srgbClr val="FFFFFF"/>
-                </a:solidFill>
-              </a14:hiddenFill>
-            </a:ext>
-          </a:extLst>
-        </p:spPr>
-      </p:pic>
     </p:spTree>
     <p:extLst>
       <p:ext uri="{BB962C8B-B14F-4D97-AF65-F5344CB8AC3E}">
-        <p14:creationId xmlns:p14="http://schemas.microsoft.com/office/powerpoint/2010/main" val="1886034423"/>
+        <p14:creationId xmlns:p14="http://schemas.microsoft.com/office/powerpoint/2010/main" val="1824664966"/>
       </p:ext>
     </p:extLst>
   </p:cSld>
@@ -5879,8 +5694,8 @@
         </p:nvSpPr>
         <p:spPr>
           <a:xfrm>
-            <a:off x="838200" y="641855"/>
-            <a:ext cx="10515600" cy="772107"/>
+            <a:off x="838199" y="611079"/>
+            <a:ext cx="10515600" cy="833663"/>
           </a:xfrm>
         </p:spPr>
         <p:txBody>
@@ -5890,7 +5705,7 @@
             <a:pPr algn="ctr"/>
             <a:r>
               <a:rPr lang="en-US" dirty="0" smtClean="0"/>
-              <a:t>Properties of An Array</a:t>
+              <a:t>Structure of An Array</a:t>
             </a:r>
             <a:endParaRPr lang="en-US" dirty="0"/>
           </a:p>
@@ -5898,7 +5713,13 @@
       </p:sp>
       <p:sp>
         <p:nvSpPr>
-          <p:cNvPr id="6" name="Content Placeholder 5"/>
+          <p:cNvPr id="3" name="Content Placeholder 2">
+            <a:extLst>
+              <a:ext uri="{FF2B5EF4-FFF2-40B4-BE49-F238E27FC236}">
+                <a16:creationId xmlns:a16="http://schemas.microsoft.com/office/drawing/2014/main" id="{FA6A4B49-27C8-46B6-8B11-AD7E8F615E2C}"/>
+              </a:ext>
+            </a:extLst>
+          </p:cNvPr>
           <p:cNvSpPr>
             <a:spLocks noGrp="1"/>
           </p:cNvSpPr>
@@ -5908,71 +5729,59 @@
         </p:nvSpPr>
         <p:spPr>
           <a:xfrm>
-            <a:off x="682625" y="2010137"/>
-            <a:ext cx="10515600" cy="4351338"/>
+            <a:off x="838200" y="1825625"/>
+            <a:ext cx="5562600" cy="4351338"/>
           </a:xfrm>
         </p:spPr>
         <p:txBody>
           <a:bodyPr>
-            <a:normAutofit/>
+            <a:normAutofit fontScale="92500" lnSpcReduction="20000"/>
           </a:bodyPr>
           <a:lstStyle/>
           <a:p>
             <a:r>
-              <a:rPr lang="en-US" sz="2400" dirty="0" smtClean="0"/>
-              <a:t>Each array object has a property named </a:t>
-            </a:r>
-            <a:r>
-              <a:rPr lang="en-US" sz="2400" b="1" i="1" u="sng" dirty="0" smtClean="0"/>
-              <a:t>length</a:t>
-            </a:r>
-            <a:r>
-              <a:rPr lang="en-US" sz="2400" dirty="0" smtClean="0"/>
-              <a:t> which can be used to find length of the array.</a:t>
-            </a:r>
-          </a:p>
-          <a:p>
-            <a:r>
-              <a:rPr lang="en-US" sz="2400" dirty="0" smtClean="0"/>
-              <a:t>Whenever we try to access an index in an array which is outside the current range of indices , JVM throws an </a:t>
-            </a:r>
-            <a:r>
-              <a:rPr lang="en-US" sz="2400" dirty="0" err="1" smtClean="0"/>
-              <a:t>ArrayIndexOutOfBoundException</a:t>
-            </a:r>
-            <a:r>
-              <a:rPr lang="en-US" sz="2400" dirty="0" smtClean="0"/>
-              <a:t>.</a:t>
-            </a:r>
-          </a:p>
-          <a:p>
-            <a:r>
-              <a:rPr lang="en-US" sz="2400" dirty="0" smtClean="0"/>
-              <a:t>An array of length 0 can be also created. It shall have no containing values. On trying to access any index of such an array, </a:t>
-            </a:r>
-            <a:r>
-              <a:rPr lang="en-US" sz="2400" dirty="0" err="1" smtClean="0"/>
-              <a:t>ArrayIndexOutOfBoundException</a:t>
-            </a:r>
-            <a:r>
-              <a:rPr lang="en-US" sz="2400" dirty="0" smtClean="0"/>
-              <a:t> is thrown.</a:t>
-            </a:r>
-          </a:p>
-          <a:p>
-            <a:r>
-              <a:rPr lang="en-US" sz="2400" dirty="0" smtClean="0"/>
-              <a:t>An array once created cannot be changed in size. Values contained in the array can be changed but size of the array itself cannot be changed.</a:t>
-            </a:r>
-          </a:p>
-          <a:p>
-            <a:r>
-              <a:rPr lang="en-US" sz="2400" dirty="0" smtClean="0"/>
-              <a:t>Arrays can be cloned using the clone() method from the object class.</a:t>
-            </a:r>
-          </a:p>
-          <a:p>
-            <a:endParaRPr lang="en-US" sz="2400" dirty="0" smtClean="0"/>
+              <a:rPr lang="en-US" sz="2800" dirty="0" smtClean="0"/>
+              <a:t>Arrays can be single dimensional or multi-dimensional.</a:t>
+            </a:r>
+          </a:p>
+          <a:p>
+            <a:r>
+              <a:rPr lang="en-US" sz="2800" dirty="0" smtClean="0"/>
+              <a:t>Figure on the right shows a </a:t>
+            </a:r>
+            <a:br>
+              <a:rPr lang="en-US" sz="2800" dirty="0" smtClean="0"/>
+            </a:br>
+            <a:r>
+              <a:rPr lang="en-US" sz="2800" dirty="0" smtClean="0"/>
+              <a:t>two-dimensional and</a:t>
+            </a:r>
+            <a:br>
+              <a:rPr lang="en-US" sz="2800" dirty="0" smtClean="0"/>
+            </a:br>
+            <a:r>
+              <a:rPr lang="en-US" sz="2800" dirty="0" smtClean="0"/>
+              <a:t>a three-dimensional array.</a:t>
+            </a:r>
+          </a:p>
+          <a:p>
+            <a:r>
+              <a:rPr lang="en-US" sz="2800" dirty="0" smtClean="0"/>
+              <a:t>A multi-dimensional array is just an extension of a 1-D array.</a:t>
+            </a:r>
+          </a:p>
+          <a:p>
+            <a:r>
+              <a:rPr lang="en-US" sz="2800" dirty="0" smtClean="0"/>
+              <a:t>For example ,a 2-D array of dimensions 3*4, can be visualized as a 1-D array of size 3 , with each block pointing to an array of size 4.</a:t>
+            </a:r>
+          </a:p>
+          <a:p>
+            <a:r>
+              <a:rPr lang="en-US" sz="2800" dirty="0" smtClean="0"/>
+              <a:t>Similarly we can extend this analogy to greater dimensions.</a:t>
+            </a:r>
+            <a:endParaRPr lang="en-US" sz="2800" dirty="0"/>
           </a:p>
         </p:txBody>
       </p:sp>
@@ -5992,7 +5801,12 @@
             <p:ph type="sldNum" sz="quarter" idx="10"/>
           </p:nvPr>
         </p:nvSpPr>
-        <p:spPr/>
+        <p:spPr>
+          <a:xfrm>
+            <a:off x="11353800" y="6361475"/>
+            <a:ext cx="838200" cy="360000"/>
+          </a:xfrm>
+        </p:spPr>
         <p:txBody>
           <a:bodyPr/>
           <a:lstStyle/>
@@ -6068,10 +5882,92 @@
           </a:p>
         </p:txBody>
       </p:sp>
+      <p:pic>
+        <p:nvPicPr>
+          <p:cNvPr id="3074" name="Picture 2" descr="Multidimensional Arrays in C++"/>
+          <p:cNvPicPr>
+            <a:picLocks noChangeAspect="1" noChangeArrowheads="1"/>
+          </p:cNvPicPr>
+          <p:nvPr/>
+        </p:nvPicPr>
+        <p:blipFill>
+          <a:blip r:embed="rId2">
+            <a:extLst>
+              <a:ext uri="{28A0092B-C50C-407E-A947-70E740481C1C}">
+                <a14:useLocalDpi xmlns:a14="http://schemas.microsoft.com/office/drawing/2010/main" val="0"/>
+              </a:ext>
+            </a:extLst>
+          </a:blip>
+          <a:srcRect/>
+          <a:stretch>
+            <a:fillRect/>
+          </a:stretch>
+        </p:blipFill>
+        <p:spPr bwMode="auto">
+          <a:xfrm>
+            <a:off x="7250545" y="1825625"/>
+            <a:ext cx="4103254" cy="1868920"/>
+          </a:xfrm>
+          <a:prstGeom prst="rect">
+            <a:avLst/>
+          </a:prstGeom>
+          <a:noFill/>
+          <a:extLst>
+            <a:ext uri="{909E8E84-426E-40DD-AFC4-6F175D3DCCD1}">
+              <a14:hiddenFill xmlns:a14="http://schemas.microsoft.com/office/drawing/2010/main">
+                <a:solidFill>
+                  <a:srgbClr val="FFFFFF"/>
+                </a:solidFill>
+              </a14:hiddenFill>
+            </a:ext>
+          </a:extLst>
+        </p:spPr>
+      </p:pic>
+      <p:pic>
+        <p:nvPicPr>
+          <p:cNvPr id="3076" name="Picture 4" descr="Multidimensional Arrays - MATLAB &amp; Simulink"/>
+          <p:cNvPicPr>
+            <a:picLocks noChangeAspect="1" noChangeArrowheads="1"/>
+          </p:cNvPicPr>
+          <p:nvPr/>
+        </p:nvPicPr>
+        <p:blipFill>
+          <a:blip r:embed="rId3">
+            <a:extLst>
+              <a:ext uri="{28A0092B-C50C-407E-A947-70E740481C1C}">
+                <a14:useLocalDpi xmlns:a14="http://schemas.microsoft.com/office/drawing/2010/main" val="0"/>
+              </a:ext>
+            </a:extLst>
+          </a:blip>
+          <a:srcRect/>
+          <a:stretch>
+            <a:fillRect/>
+          </a:stretch>
+        </p:blipFill>
+        <p:spPr bwMode="auto">
+          <a:xfrm>
+            <a:off x="7250545" y="4075428"/>
+            <a:ext cx="4103254" cy="1971676"/>
+          </a:xfrm>
+          <a:prstGeom prst="rect">
+            <a:avLst/>
+          </a:prstGeom>
+          <a:noFill/>
+          <a:extLst>
+            <a:ext uri="{909E8E84-426E-40DD-AFC4-6F175D3DCCD1}">
+              <a14:hiddenFill xmlns:a14="http://schemas.microsoft.com/office/drawing/2010/main">
+                <a:solidFill>
+                  <a:srgbClr val="FFFFFF"/>
+                </a:solidFill>
+              </a14:hiddenFill>
+            </a:ext>
+          </a:extLst>
+        </p:spPr>
+      </p:pic>
     </p:spTree>
     <p:extLst>
       <p:ext uri="{BB962C8B-B14F-4D97-AF65-F5344CB8AC3E}">
-        <p14:creationId xmlns:p14="http://schemas.microsoft.com/office/powerpoint/2010/main" val="1287735390"/>
+        <p14:creationId xmlns:p14="http://schemas.microsoft.com/office/powerpoint/2010/main" val="1886034423"/>
       </p:ext>
     </p:extLst>
   </p:cSld>
@@ -6164,20 +6060,59 @@
           <a:p>
             <a:r>
               <a:rPr lang="en-US" sz="2400" dirty="0" smtClean="0"/>
-              <a:t>As all objects in java extend from Object class , similarly an array object also extends from Object class.</a:t>
-            </a:r>
-          </a:p>
-          <a:p>
+              <a:t>Each array object has a property named </a:t>
+            </a:r>
+            <a:r>
+              <a:rPr lang="en-US" sz="2400" b="1" i="1" u="sng" dirty="0" smtClean="0"/>
+              <a:t>length</a:t>
+            </a:r>
             <a:r>
               <a:rPr lang="en-US" sz="2400" dirty="0" smtClean="0"/>
-              <a:t>Therefore an array of Object type can hold objects of all types whether it be primitive or reference types.</a:t>
+              <a:t> which can be used to find length of the array.</a:t>
             </a:r>
           </a:p>
           <a:p>
             <a:r>
               <a:rPr lang="en-US" sz="2400" dirty="0" smtClean="0"/>
-              <a:t>Since arrays are objects , hence all arrays are assigned default values at the time of creation. All primitive type arrays are assigned default values as zero while non-primitives are assigned null.</a:t>
-            </a:r>
+              <a:t>Whenever we try to access an index in an array which is outside the current range of indices , JVM throws an </a:t>
+            </a:r>
+            <a:r>
+              <a:rPr lang="en-US" sz="2400" dirty="0" err="1" smtClean="0"/>
+              <a:t>ArrayIndexOutOfBoundException</a:t>
+            </a:r>
+            <a:r>
+              <a:rPr lang="en-US" sz="2400" dirty="0" smtClean="0"/>
+              <a:t>.</a:t>
+            </a:r>
+          </a:p>
+          <a:p>
+            <a:r>
+              <a:rPr lang="en-US" sz="2400" dirty="0" smtClean="0"/>
+              <a:t>An array of length 0 can be also created. It shall have no containing values. On trying to access any index of such an array, </a:t>
+            </a:r>
+            <a:r>
+              <a:rPr lang="en-US" sz="2400" dirty="0" err="1" smtClean="0"/>
+              <a:t>ArrayIndexOutOfBoundException</a:t>
+            </a:r>
+            <a:r>
+              <a:rPr lang="en-US" sz="2400" dirty="0" smtClean="0"/>
+              <a:t> is thrown.</a:t>
+            </a:r>
+          </a:p>
+          <a:p>
+            <a:r>
+              <a:rPr lang="en-US" sz="2400" dirty="0" smtClean="0"/>
+              <a:t>An array once created cannot be changed in size. Values contained in the array can be changed but size of the array itself cannot be changed.</a:t>
+            </a:r>
+          </a:p>
+          <a:p>
+            <a:r>
+              <a:rPr lang="en-US" sz="2400" dirty="0" smtClean="0"/>
+              <a:t>Arrays can be cloned using the clone() method from the object class.</a:t>
+            </a:r>
+          </a:p>
+          <a:p>
+            <a:endParaRPr lang="en-US" sz="2400" dirty="0" smtClean="0"/>
           </a:p>
         </p:txBody>
       </p:sp>
@@ -6276,7 +6211,7 @@
     </p:spTree>
     <p:extLst>
       <p:ext uri="{BB962C8B-B14F-4D97-AF65-F5344CB8AC3E}">
-        <p14:creationId xmlns:p14="http://schemas.microsoft.com/office/powerpoint/2010/main" val="1023982374"/>
+        <p14:creationId xmlns:p14="http://schemas.microsoft.com/office/powerpoint/2010/main" val="1287735390"/>
       </p:ext>
     </p:extLst>
   </p:cSld>
@@ -6315,6 +6250,211 @@
           <p:cNvPr id="2" name="Title 1">
             <a:extLst>
               <a:ext uri="{FF2B5EF4-FFF2-40B4-BE49-F238E27FC236}">
+                <a16:creationId xmlns:a16="http://schemas.microsoft.com/office/drawing/2014/main" id="{E199600F-A17E-4354-A7AB-0CC2A43A9354}"/>
+              </a:ext>
+            </a:extLst>
+          </p:cNvPr>
+          <p:cNvSpPr>
+            <a:spLocks noGrp="1"/>
+          </p:cNvSpPr>
+          <p:nvPr>
+            <p:ph type="title"/>
+          </p:nvPr>
+        </p:nvSpPr>
+        <p:spPr>
+          <a:xfrm>
+            <a:off x="838200" y="641855"/>
+            <a:ext cx="10515600" cy="772107"/>
+          </a:xfrm>
+        </p:spPr>
+        <p:txBody>
+          <a:bodyPr/>
+          <a:lstStyle/>
+          <a:p>
+            <a:pPr algn="ctr"/>
+            <a:r>
+              <a:rPr lang="en-US" dirty="0" smtClean="0"/>
+              <a:t>Properties of An Array</a:t>
+            </a:r>
+            <a:endParaRPr lang="en-US" dirty="0"/>
+          </a:p>
+        </p:txBody>
+      </p:sp>
+      <p:sp>
+        <p:nvSpPr>
+          <p:cNvPr id="6" name="Content Placeholder 5"/>
+          <p:cNvSpPr>
+            <a:spLocks noGrp="1"/>
+          </p:cNvSpPr>
+          <p:nvPr>
+            <p:ph idx="1"/>
+          </p:nvPr>
+        </p:nvSpPr>
+        <p:spPr>
+          <a:xfrm>
+            <a:off x="682625" y="2010137"/>
+            <a:ext cx="10515600" cy="4351338"/>
+          </a:xfrm>
+        </p:spPr>
+        <p:txBody>
+          <a:bodyPr>
+            <a:normAutofit/>
+          </a:bodyPr>
+          <a:lstStyle/>
+          <a:p>
+            <a:r>
+              <a:rPr lang="en-US" sz="2400" dirty="0" smtClean="0"/>
+              <a:t>As all objects in java extend from Object class , similarly an array object also extends from Object class.</a:t>
+            </a:r>
+          </a:p>
+          <a:p>
+            <a:r>
+              <a:rPr lang="en-US" sz="2400" dirty="0" smtClean="0"/>
+              <a:t>Therefore an array of Object type can hold objects of all types whether it be primitive or reference types.</a:t>
+            </a:r>
+          </a:p>
+          <a:p>
+            <a:r>
+              <a:rPr lang="en-US" sz="2400" dirty="0" smtClean="0"/>
+              <a:t>Since arrays are objects , hence all arrays are assigned default values at the time of creation. All primitive type arrays are assigned default values as zero while non-primitives are assigned null.</a:t>
+            </a:r>
+          </a:p>
+        </p:txBody>
+      </p:sp>
+      <p:sp>
+        <p:nvSpPr>
+          <p:cNvPr id="4" name="Slide Number Placeholder 3">
+            <a:extLst>
+              <a:ext uri="{FF2B5EF4-FFF2-40B4-BE49-F238E27FC236}">
+                <a16:creationId xmlns:a16="http://schemas.microsoft.com/office/drawing/2014/main" id="{62B4CE3A-8C88-45AA-A849-57E5A7AC22C1}"/>
+              </a:ext>
+            </a:extLst>
+          </p:cNvPr>
+          <p:cNvSpPr>
+            <a:spLocks noGrp="1"/>
+          </p:cNvSpPr>
+          <p:nvPr>
+            <p:ph type="sldNum" sz="quarter" idx="10"/>
+          </p:nvPr>
+        </p:nvSpPr>
+        <p:spPr/>
+        <p:txBody>
+          <a:bodyPr/>
+          <a:lstStyle/>
+          <a:p>
+            <a:r>
+              <a:rPr lang="en-US" dirty="0"/>
+              <a:t>PAGE </a:t>
+            </a:r>
+            <a:fld id="{4A9B5881-4007-4345-955A-79C2656F0C49}" type="slidenum">
+              <a:rPr lang="en-US" smtClean="0"/>
+              <a:pPr/>
+              <a:t>8</a:t>
+            </a:fld>
+            <a:endParaRPr lang="en-US" dirty="0"/>
+          </a:p>
+        </p:txBody>
+      </p:sp>
+      <p:sp>
+        <p:nvSpPr>
+          <p:cNvPr id="11" name="Rectangle 10">
+            <a:extLst>
+              <a:ext uri="{FF2B5EF4-FFF2-40B4-BE49-F238E27FC236}">
+                <a16:creationId xmlns:a16="http://schemas.microsoft.com/office/drawing/2014/main" id="{5F253864-26FA-4AB1-9F0A-4F57D870EE85}"/>
+              </a:ext>
+              <a:ext uri="{C183D7F6-B498-43B3-948B-1728B52AA6E4}">
+                <adec:decorative xmlns="" xmlns:adec="http://schemas.microsoft.com/office/drawing/2017/decorative" val="1"/>
+              </a:ext>
+            </a:extLst>
+          </p:cNvPr>
+          <p:cNvSpPr/>
+          <p:nvPr/>
+        </p:nvSpPr>
+        <p:spPr>
+          <a:xfrm>
+            <a:off x="6249555" y="6562004"/>
+            <a:ext cx="2552123" cy="159471"/>
+          </a:xfrm>
+          <a:prstGeom prst="rect">
+            <a:avLst/>
+          </a:prstGeom>
+          <a:solidFill>
+            <a:schemeClr val="tx1">
+              <a:lumMod val="85000"/>
+              <a:lumOff val="15000"/>
+            </a:schemeClr>
+          </a:solidFill>
+          <a:ln>
+            <a:noFill/>
+          </a:ln>
+        </p:spPr>
+        <p:style>
+          <a:lnRef idx="2">
+            <a:schemeClr val="accent1">
+              <a:shade val="50000"/>
+            </a:schemeClr>
+          </a:lnRef>
+          <a:fillRef idx="1">
+            <a:schemeClr val="accent1"/>
+          </a:fillRef>
+          <a:effectRef idx="0">
+            <a:schemeClr val="accent1"/>
+          </a:effectRef>
+          <a:fontRef idx="minor">
+            <a:schemeClr val="lt1"/>
+          </a:fontRef>
+        </p:style>
+        <p:txBody>
+          <a:bodyPr anchor="ctr"/>
+          <a:lstStyle/>
+          <a:p>
+            <a:pPr algn="ctr"/>
+            <a:endParaRPr lang="en-US" sz="1200" dirty="0"/>
+          </a:p>
+        </p:txBody>
+      </p:sp>
+    </p:spTree>
+    <p:extLst>
+      <p:ext uri="{BB962C8B-B14F-4D97-AF65-F5344CB8AC3E}">
+        <p14:creationId xmlns:p14="http://schemas.microsoft.com/office/powerpoint/2010/main" val="1023982374"/>
+      </p:ext>
+    </p:extLst>
+  </p:cSld>
+  <p:clrMapOvr>
+    <a:masterClrMapping/>
+  </p:clrMapOvr>
+  <p:timing>
+    <p:tnLst>
+      <p:par>
+        <p:cTn id="1" dur="indefinite" restart="never" nodeType="tmRoot"/>
+      </p:par>
+    </p:tnLst>
+  </p:timing>
+</p:sld>
+</file>
+
+<file path=ppt/slides/slide9.xml><?xml version="1.0" encoding="utf-8"?>
+<p:sld xmlns:a="http://schemas.openxmlformats.org/drawingml/2006/main" xmlns:r="http://schemas.openxmlformats.org/officeDocument/2006/relationships" xmlns:p="http://schemas.openxmlformats.org/presentationml/2006/main">
+  <p:cSld>
+    <p:spTree>
+      <p:nvGrpSpPr>
+        <p:cNvPr id="1" name=""/>
+        <p:cNvGrpSpPr/>
+        <p:nvPr/>
+      </p:nvGrpSpPr>
+      <p:grpSpPr>
+        <a:xfrm>
+          <a:off x="0" y="0"/>
+          <a:ext cx="0" cy="0"/>
+          <a:chOff x="0" y="0"/>
+          <a:chExt cx="0" cy="0"/>
+        </a:xfrm>
+      </p:grpSpPr>
+      <p:sp>
+        <p:nvSpPr>
+          <p:cNvPr id="2" name="Title 1">
+            <a:extLst>
+              <a:ext uri="{FF2B5EF4-FFF2-40B4-BE49-F238E27FC236}">
                 <a16:creationId xmlns:a16="http://schemas.microsoft.com/office/drawing/2014/main" id="{C8F58AE6-56F6-44E8-8BBF-23277B1773E4}"/>
               </a:ext>
             </a:extLst>
@@ -6401,7 +6541,7 @@
             <a:fld id="{4A9B5881-4007-4345-955A-79C2656F0C49}" type="slidenum">
               <a:rPr lang="en-US" smtClean="0"/>
               <a:pPr/>
-              <a:t>8</a:t>
+              <a:t>9</a:t>
             </a:fld>
             <a:endParaRPr lang="en-US" dirty="0"/>
           </a:p>
@@ -7388,15 +7528,6 @@
 </file>
 
 <file path=customXml/item1.xml><?xml version="1.0" encoding="utf-8"?>
-<p:properties xmlns:p="http://schemas.microsoft.com/office/2006/metadata/properties" xmlns:xsi="http://www.w3.org/2001/XMLSchema-instance" xmlns:pc="http://schemas.microsoft.com/office/infopath/2007/PartnerControls">
-  <documentManagement>
-    <Status xmlns="71af3243-3dd4-4a8d-8c0d-dd76da1f02a5">Not started</Status>
-    <MediaServiceKeyPoints xmlns="71af3243-3dd4-4a8d-8c0d-dd76da1f02a5" xsi:nil="true"/>
-  </documentManagement>
-</p:properties>
-</file>
-
-<file path=customXml/item2.xml><?xml version="1.0" encoding="utf-8"?>
 <?mso-contentType ?>
 <FormTemplates xmlns="http://schemas.microsoft.com/sharepoint/v3/contenttype/forms">
   <Display>DocumentLibraryForm</Display>
@@ -7405,7 +7536,7 @@
 </FormTemplates>
 </file>
 
-<file path=customXml/item3.xml><?xml version="1.0" encoding="utf-8"?>
+<file path=customXml/item2.xml><?xml version="1.0" encoding="utf-8"?>
 <ct:contentTypeSchema xmlns:ct="http://schemas.microsoft.com/office/2006/metadata/contentType" xmlns:ma="http://schemas.microsoft.com/office/2006/metadata/properties/metaAttributes" ct:_="" ma:_="" ma:contentTypeName="Document" ma:contentTypeID="0x01010079F111ED35F8CC479449609E8A0923A6" ma:contentTypeVersion="12" ma:contentTypeDescription="Create a new document." ma:contentTypeScope="" ma:versionID="fa6e671f1cd7e4d96ff9652be322dd5e">
   <xsd:schema xmlns:xsd="http://www.w3.org/2001/XMLSchema" xmlns:xs="http://www.w3.org/2001/XMLSchema" xmlns:p="http://schemas.microsoft.com/office/2006/metadata/properties" xmlns:ns2="71af3243-3dd4-4a8d-8c0d-dd76da1f02a5" xmlns:ns3="16c05727-aa75-4e4a-9b5f-8a80a1165891" targetNamespace="http://schemas.microsoft.com/office/2006/metadata/properties" ma:root="true" ma:fieldsID="4e2496f70b101db0b8013f30a071bbf7" ns2:_="" ns3:_="">
     <xsd:import namespace="71af3243-3dd4-4a8d-8c0d-dd76da1f02a5"/>
@@ -7626,17 +7757,16 @@
 </ct:contentTypeSchema>
 </file>
 
-<file path=customXml/itemProps1.xml><?xml version="1.0" encoding="utf-8"?>
-<ds:datastoreItem xmlns:ds="http://schemas.openxmlformats.org/officeDocument/2006/customXml" ds:itemID="{F4E32C0B-4052-44CB-9341-8AD8B2CC4712}">
-  <ds:schemaRefs>
-    <ds:schemaRef ds:uri="http://schemas.microsoft.com/office/2006/metadata/properties"/>
-    <ds:schemaRef ds:uri="http://schemas.microsoft.com/office/infopath/2007/PartnerControls"/>
-    <ds:schemaRef ds:uri="71af3243-3dd4-4a8d-8c0d-dd76da1f02a5"/>
-  </ds:schemaRefs>
-</ds:datastoreItem>
+<file path=customXml/item3.xml><?xml version="1.0" encoding="utf-8"?>
+<p:properties xmlns:p="http://schemas.microsoft.com/office/2006/metadata/properties" xmlns:xsi="http://www.w3.org/2001/XMLSchema-instance" xmlns:pc="http://schemas.microsoft.com/office/infopath/2007/PartnerControls">
+  <documentManagement>
+    <Status xmlns="71af3243-3dd4-4a8d-8c0d-dd76da1f02a5">Not started</Status>
+    <MediaServiceKeyPoints xmlns="71af3243-3dd4-4a8d-8c0d-dd76da1f02a5" xsi:nil="true"/>
+  </documentManagement>
+</p:properties>
 </file>
 
-<file path=customXml/itemProps2.xml><?xml version="1.0" encoding="utf-8"?>
+<file path=customXml/itemProps1.xml><?xml version="1.0" encoding="utf-8"?>
 <ds:datastoreItem xmlns:ds="http://schemas.openxmlformats.org/officeDocument/2006/customXml" ds:itemID="{EBB7C387-AFDC-4FE3-A658-984B7F35F155}">
   <ds:schemaRefs>
     <ds:schemaRef ds:uri="http://schemas.microsoft.com/sharepoint/v3/contenttype/forms"/>
@@ -7644,7 +7774,7 @@
 </ds:datastoreItem>
 </file>
 
-<file path=customXml/itemProps3.xml><?xml version="1.0" encoding="utf-8"?>
+<file path=customXml/itemProps2.xml><?xml version="1.0" encoding="utf-8"?>
 <ds:datastoreItem xmlns:ds="http://schemas.openxmlformats.org/officeDocument/2006/customXml" ds:itemID="{D6766BD6-F648-49AA-B7EC-13E75CECB99A}">
   <ds:schemaRefs>
     <ds:schemaRef ds:uri="http://schemas.microsoft.com/office/2006/metadata/contentType"/>
@@ -7661,4 +7791,14 @@
     <ds:schemaRef ds:uri="http://schemas.microsoft.com/internal/obd"/>
   </ds:schemaRefs>
 </ds:datastoreItem>
+</file>
+
+<file path=customXml/itemProps3.xml><?xml version="1.0" encoding="utf-8"?>
+<ds:datastoreItem xmlns:ds="http://schemas.openxmlformats.org/officeDocument/2006/customXml" ds:itemID="{F4E32C0B-4052-44CB-9341-8AD8B2CC4712}">
+  <ds:schemaRefs>
+    <ds:schemaRef ds:uri="http://schemas.microsoft.com/office/2006/metadata/properties"/>
+    <ds:schemaRef ds:uri="http://schemas.microsoft.com/office/infopath/2007/PartnerControls"/>
+    <ds:schemaRef ds:uri="71af3243-3dd4-4a8d-8c0d-dd76da1f02a5"/>
+  </ds:schemaRefs>
+</ds:datastoreItem>
 </file>
</xml_diff>